<commit_message>
updated readme with what is required
</commit_message>
<xml_diff>
--- a/Azure-Function-203.pptx
+++ b/Azure-Function-203.pptx
@@ -6,10 +6,10 @@
     <p:sldMasterId id="2147483902" r:id="rId2"/>
   </p:sldMasterIdLst>
   <p:notesMasterIdLst>
-    <p:notesMasterId r:id="rId8"/>
+    <p:notesMasterId r:id="rId9"/>
   </p:notesMasterIdLst>
   <p:handoutMasterIdLst>
-    <p:handoutMasterId r:id="rId9"/>
+    <p:handoutMasterId r:id="rId10"/>
   </p:handoutMasterIdLst>
   <p:sldIdLst>
     <p:sldId id="302" r:id="rId3"/>
@@ -17,11 +17,12 @@
     <p:sldId id="560" r:id="rId5"/>
     <p:sldId id="561" r:id="rId6"/>
     <p:sldId id="562" r:id="rId7"/>
+    <p:sldId id="563" r:id="rId8"/>
   </p:sldIdLst>
   <p:sldSz cx="12192000" cy="6858000"/>
   <p:notesSz cx="6797675" cy="9926638"/>
   <p:custDataLst>
-    <p:tags r:id="rId10"/>
+    <p:tags r:id="rId11"/>
   </p:custDataLst>
   <p:defaultTextStyle>
     <a:defPPr>
@@ -255,7 +256,7 @@
             <a:fld id="{86C988DC-9DE3-4390-97AB-D61B85DACE57}" type="datetimeFigureOut">
               <a:rPr lang="pt-PT" sz="900" smtClean="0"/>
               <a:pPr/>
-              <a:t>08/08/2019</a:t>
+              <a:t>20/08/2019</a:t>
             </a:fld>
             <a:endParaRPr lang="pt-PT" sz="900"/>
           </a:p>
@@ -434,7 +435,7 @@
             <a:fld id="{0835B8F7-DAC4-4931-8AED-4356A8B2FD64}" type="datetimeFigureOut">
               <a:rPr lang="pt-BR" smtClean="0"/>
               <a:pPr/>
-              <a:t>08/08/2019</a:t>
+              <a:t>20/08/2019</a:t>
             </a:fld>
             <a:endParaRPr lang="pt-BR"/>
           </a:p>
@@ -712,7 +713,7 @@
           <a:graphicData uri="http://schemas.openxmlformats.org/presentationml/2006/ole">
             <mc:AlternateContent xmlns:mc="http://schemas.openxmlformats.org/markup-compatibility/2006">
               <mc:Choice xmlns:v="urn:schemas-microsoft-com:vml" Requires="v">
-                <p:oleObj spid="_x0000_s9689" name="think-cell Slide" r:id="rId4" imgW="270" imgH="270" progId="TCLayout.ActiveDocument.1">
+                <p:oleObj spid="_x0000_s9691" name="think-cell Slide" r:id="rId4" imgW="270" imgH="270" progId="TCLayout.ActiveDocument.1">
                   <p:embed/>
                 </p:oleObj>
               </mc:Choice>
@@ -849,7 +850,7 @@
           <a:graphicData uri="http://schemas.openxmlformats.org/presentationml/2006/ole">
             <mc:AlternateContent xmlns:mc="http://schemas.openxmlformats.org/markup-compatibility/2006">
               <mc:Choice xmlns:v="urn:schemas-microsoft-com:vml" Requires="v">
-                <p:oleObj spid="_x0000_s112755" name="think-cell Slide" r:id="rId4" imgW="270" imgH="270" progId="TCLayout.ActiveDocument.1">
+                <p:oleObj spid="_x0000_s112757" name="think-cell Slide" r:id="rId4" imgW="270" imgH="270" progId="TCLayout.ActiveDocument.1">
                   <p:embed/>
                 </p:oleObj>
               </mc:Choice>
@@ -1321,7 +1322,7 @@
           <a:graphicData uri="http://schemas.openxmlformats.org/presentationml/2006/ole">
             <mc:AlternateContent xmlns:mc="http://schemas.openxmlformats.org/markup-compatibility/2006">
               <mc:Choice xmlns:v="urn:schemas-microsoft-com:vml" Requires="v">
-                <p:oleObj spid="_x0000_s103594" name="think-cell Slide" r:id="rId4" imgW="270" imgH="270" progId="TCLayout.ActiveDocument.1">
+                <p:oleObj spid="_x0000_s103596" name="think-cell Slide" r:id="rId4" imgW="270" imgH="270" progId="TCLayout.ActiveDocument.1">
                   <p:embed/>
                 </p:oleObj>
               </mc:Choice>
@@ -1523,7 +1524,7 @@
           <a:graphicData uri="http://schemas.openxmlformats.org/presentationml/2006/ole">
             <mc:AlternateContent xmlns:mc="http://schemas.openxmlformats.org/markup-compatibility/2006">
               <mc:Choice xmlns:v="urn:schemas-microsoft-com:vml" Requires="v">
-                <p:oleObj spid="_x0000_s108699" name="think-cell Slide" r:id="rId4" imgW="270" imgH="270" progId="TCLayout.ActiveDocument.1">
+                <p:oleObj spid="_x0000_s108701" name="think-cell Slide" r:id="rId4" imgW="270" imgH="270" progId="TCLayout.ActiveDocument.1">
                   <p:embed/>
                 </p:oleObj>
               </mc:Choice>
@@ -1725,7 +1726,7 @@
           <a:graphicData uri="http://schemas.openxmlformats.org/presentationml/2006/ole">
             <mc:AlternateContent xmlns:mc="http://schemas.openxmlformats.org/markup-compatibility/2006">
               <mc:Choice xmlns:v="urn:schemas-microsoft-com:vml" Requires="v">
-                <p:oleObj spid="_x0000_s97512" name="think-cell Slide" r:id="rId4" imgW="270" imgH="270" progId="TCLayout.ActiveDocument.1">
+                <p:oleObj spid="_x0000_s97514" name="think-cell Slide" r:id="rId4" imgW="270" imgH="270" progId="TCLayout.ActiveDocument.1">
                   <p:embed/>
                 </p:oleObj>
               </mc:Choice>
@@ -4465,7 +4466,7 @@
           <a:graphicData uri="http://schemas.openxmlformats.org/presentationml/2006/ole">
             <mc:AlternateContent xmlns:mc="http://schemas.openxmlformats.org/markup-compatibility/2006">
               <mc:Choice xmlns:v="urn:schemas-microsoft-com:vml" Requires="v">
-                <p:oleObj spid="_x0000_s92430" name="think-cell Slide" r:id="rId5" imgW="270" imgH="270" progId="TCLayout.ActiveDocument.1">
+                <p:oleObj spid="_x0000_s92432" name="think-cell Slide" r:id="rId5" imgW="270" imgH="270" progId="TCLayout.ActiveDocument.1">
                   <p:embed/>
                 </p:oleObj>
               </mc:Choice>
@@ -5161,7 +5162,7 @@
             </a:ln>
             <a:extLst>
               <a:ext uri="{91240B29-F687-4f45-9708-019B960494DF}">
-                <a14:hiddenLine xmlns="" xmlns:a14="http://schemas.microsoft.com/office/drawing/2010/main" w="9525">
+                <a14:hiddenLine xmlns:a14="http://schemas.microsoft.com/office/drawing/2010/main" xmlns="" w="9525">
                   <a:solidFill>
                     <a:srgbClr val="000000"/>
                   </a:solidFill>
@@ -5553,7 +5554,7 @@
             </a:ln>
             <a:extLst>
               <a:ext uri="{91240B29-F687-4f45-9708-019B960494DF}">
-                <a14:hiddenLine xmlns="" xmlns:a14="http://schemas.microsoft.com/office/drawing/2010/main" w="9525">
+                <a14:hiddenLine xmlns:a14="http://schemas.microsoft.com/office/drawing/2010/main" xmlns="" w="9525">
                   <a:solidFill>
                     <a:srgbClr val="000000"/>
                   </a:solidFill>
@@ -5877,7 +5878,7 @@
             </a:ln>
             <a:extLst>
               <a:ext uri="{91240B29-F687-4f45-9708-019B960494DF}">
-                <a14:hiddenLine xmlns="" xmlns:a14="http://schemas.microsoft.com/office/drawing/2010/main" w="9525">
+                <a14:hiddenLine xmlns:a14="http://schemas.microsoft.com/office/drawing/2010/main" xmlns="" w="9525">
                   <a:solidFill>
                     <a:srgbClr val="000000"/>
                   </a:solidFill>
@@ -6201,7 +6202,7 @@
             </a:ln>
             <a:extLst>
               <a:ext uri="{91240B29-F687-4f45-9708-019B960494DF}">
-                <a14:hiddenLine xmlns="" xmlns:a14="http://schemas.microsoft.com/office/drawing/2010/main" w="9525">
+                <a14:hiddenLine xmlns:a14="http://schemas.microsoft.com/office/drawing/2010/main" xmlns="" w="9525">
                   <a:solidFill>
                     <a:srgbClr val="000000"/>
                   </a:solidFill>
@@ -6394,7 +6395,7 @@
             </a:ln>
             <a:extLst>
               <a:ext uri="{91240B29-F687-4f45-9708-019B960494DF}">
-                <a14:hiddenLine xmlns="" xmlns:a14="http://schemas.microsoft.com/office/drawing/2010/main" w="9525">
+                <a14:hiddenLine xmlns:a14="http://schemas.microsoft.com/office/drawing/2010/main" xmlns="" w="9525">
                   <a:solidFill>
                     <a:srgbClr val="000000"/>
                   </a:solidFill>
@@ -6786,7 +6787,7 @@
             </a:ln>
             <a:extLst>
               <a:ext uri="{91240B29-F687-4f45-9708-019B960494DF}">
-                <a14:hiddenLine xmlns="" xmlns:a14="http://schemas.microsoft.com/office/drawing/2010/main" w="9525">
+                <a14:hiddenLine xmlns:a14="http://schemas.microsoft.com/office/drawing/2010/main" xmlns="" w="9525">
                   <a:solidFill>
                     <a:srgbClr val="000000"/>
                   </a:solidFill>
@@ -7169,7 +7170,7 @@
             </a:ln>
             <a:extLst>
               <a:ext uri="{91240B29-F687-4f45-9708-019B960494DF}">
-                <a14:hiddenLine xmlns="" xmlns:a14="http://schemas.microsoft.com/office/drawing/2010/main" w="9525">
+                <a14:hiddenLine xmlns:a14="http://schemas.microsoft.com/office/drawing/2010/main" xmlns="" w="9525">
                   <a:solidFill>
                     <a:srgbClr val="000000"/>
                   </a:solidFill>
@@ -7623,7 +7624,7 @@
             </a:ln>
             <a:extLst>
               <a:ext uri="{91240B29-F687-4f45-9708-019B960494DF}">
-                <a14:hiddenLine xmlns="" xmlns:a14="http://schemas.microsoft.com/office/drawing/2010/main" w="9525">
+                <a14:hiddenLine xmlns:a14="http://schemas.microsoft.com/office/drawing/2010/main" xmlns="" w="9525">
                   <a:solidFill>
                     <a:srgbClr val="000000"/>
                   </a:solidFill>
@@ -7876,7 +7877,7 @@
             </a:ln>
             <a:extLst>
               <a:ext uri="{91240B29-F687-4f45-9708-019B960494DF}">
-                <a14:hiddenLine xmlns="" xmlns:a14="http://schemas.microsoft.com/office/drawing/2010/main" w="9525">
+                <a14:hiddenLine xmlns:a14="http://schemas.microsoft.com/office/drawing/2010/main" xmlns="" w="9525">
                   <a:solidFill>
                     <a:srgbClr val="000000"/>
                   </a:solidFill>
@@ -8129,7 +8130,7 @@
             </a:ln>
             <a:extLst>
               <a:ext uri="{91240B29-F687-4f45-9708-019B960494DF}">
-                <a14:hiddenLine xmlns="" xmlns:a14="http://schemas.microsoft.com/office/drawing/2010/main" w="9525">
+                <a14:hiddenLine xmlns:a14="http://schemas.microsoft.com/office/drawing/2010/main" xmlns="" w="9525">
                   <a:solidFill>
                     <a:srgbClr val="000000"/>
                   </a:solidFill>
@@ -8521,7 +8522,7 @@
             </a:ln>
             <a:extLst>
               <a:ext uri="{91240B29-F687-4f45-9708-019B960494DF}">
-                <a14:hiddenLine xmlns="" xmlns:a14="http://schemas.microsoft.com/office/drawing/2010/main" w="9525">
+                <a14:hiddenLine xmlns:a14="http://schemas.microsoft.com/office/drawing/2010/main" xmlns="" w="9525">
                   <a:solidFill>
                     <a:srgbClr val="000000"/>
                   </a:solidFill>
@@ -8734,7 +8735,7 @@
             </a:ln>
             <a:extLst>
               <a:ext uri="{91240B29-F687-4f45-9708-019B960494DF}">
-                <a14:hiddenLine xmlns="" xmlns:a14="http://schemas.microsoft.com/office/drawing/2010/main" w="9525">
+                <a14:hiddenLine xmlns:a14="http://schemas.microsoft.com/office/drawing/2010/main" xmlns="" w="9525">
                   <a:solidFill>
                     <a:srgbClr val="000000"/>
                   </a:solidFill>
@@ -8907,7 +8908,7 @@
             </a:ln>
             <a:extLst>
               <a:ext uri="{91240B29-F687-4f45-9708-019B960494DF}">
-                <a14:hiddenLine xmlns="" xmlns:a14="http://schemas.microsoft.com/office/drawing/2010/main" w="9525">
+                <a14:hiddenLine xmlns:a14="http://schemas.microsoft.com/office/drawing/2010/main" xmlns="" w="9525">
                   <a:solidFill>
                     <a:srgbClr val="000000"/>
                   </a:solidFill>
@@ -9120,7 +9121,7 @@
             </a:ln>
             <a:extLst>
               <a:ext uri="{91240B29-F687-4f45-9708-019B960494DF}">
-                <a14:hiddenLine xmlns="" xmlns:a14="http://schemas.microsoft.com/office/drawing/2010/main" w="9525">
+                <a14:hiddenLine xmlns:a14="http://schemas.microsoft.com/office/drawing/2010/main" xmlns="" w="9525">
                   <a:solidFill>
                     <a:srgbClr val="000000"/>
                   </a:solidFill>
@@ -9512,7 +9513,7 @@
             </a:ln>
             <a:extLst>
               <a:ext uri="{91240B29-F687-4f45-9708-019B960494DF}">
-                <a14:hiddenLine xmlns="" xmlns:a14="http://schemas.microsoft.com/office/drawing/2010/main" w="9525">
+                <a14:hiddenLine xmlns:a14="http://schemas.microsoft.com/office/drawing/2010/main" xmlns="" w="9525">
                   <a:solidFill>
                     <a:srgbClr val="000000"/>
                   </a:solidFill>
@@ -9907,7 +9908,7 @@
             </a:ln>
             <a:extLst>
               <a:ext uri="{91240B29-F687-4f45-9708-019B960494DF}">
-                <a14:hiddenLine xmlns="" xmlns:a14="http://schemas.microsoft.com/office/drawing/2010/main" w="9525">
+                <a14:hiddenLine xmlns:a14="http://schemas.microsoft.com/office/drawing/2010/main" xmlns="" w="9525">
                   <a:solidFill>
                     <a:srgbClr val="000000"/>
                   </a:solidFill>
@@ -10140,7 +10141,7 @@
             </a:ln>
             <a:extLst>
               <a:ext uri="{91240B29-F687-4f45-9708-019B960494DF}">
-                <a14:hiddenLine xmlns="" xmlns:a14="http://schemas.microsoft.com/office/drawing/2010/main" w="9525">
+                <a14:hiddenLine xmlns:a14="http://schemas.microsoft.com/office/drawing/2010/main" xmlns="" w="9525">
                   <a:solidFill>
                     <a:srgbClr val="000000"/>
                   </a:solidFill>
@@ -10333,7 +10334,7 @@
             </a:ln>
             <a:extLst>
               <a:ext uri="{91240B29-F687-4f45-9708-019B960494DF}">
-                <a14:hiddenLine xmlns="" xmlns:a14="http://schemas.microsoft.com/office/drawing/2010/main" w="9525">
+                <a14:hiddenLine xmlns:a14="http://schemas.microsoft.com/office/drawing/2010/main" xmlns="" w="9525">
                   <a:solidFill>
                     <a:srgbClr val="000000"/>
                   </a:solidFill>
@@ -10586,7 +10587,7 @@
             </a:ln>
             <a:extLst>
               <a:ext uri="{91240B29-F687-4f45-9708-019B960494DF}">
-                <a14:hiddenLine xmlns="" xmlns:a14="http://schemas.microsoft.com/office/drawing/2010/main" w="9525">
+                <a14:hiddenLine xmlns:a14="http://schemas.microsoft.com/office/drawing/2010/main" xmlns="" w="9525">
                   <a:solidFill>
                     <a:srgbClr val="000000"/>
                   </a:solidFill>
@@ -10981,7 +10982,7 @@
             </a:ln>
             <a:extLst>
               <a:ext uri="{91240B29-F687-4f45-9708-019B960494DF}">
-                <a14:hiddenLine xmlns="" xmlns:a14="http://schemas.microsoft.com/office/drawing/2010/main" w="9525">
+                <a14:hiddenLine xmlns:a14="http://schemas.microsoft.com/office/drawing/2010/main" xmlns="" w="9525">
                   <a:solidFill>
                     <a:srgbClr val="000000"/>
                   </a:solidFill>
@@ -11266,7 +11267,7 @@
             </a:ln>
             <a:extLst>
               <a:ext uri="{91240B29-F687-4f45-9708-019B960494DF}">
-                <a14:hiddenLine xmlns="" xmlns:a14="http://schemas.microsoft.com/office/drawing/2010/main" w="9525">
+                <a14:hiddenLine xmlns:a14="http://schemas.microsoft.com/office/drawing/2010/main" xmlns="" w="9525">
                   <a:solidFill>
                     <a:srgbClr val="000000"/>
                   </a:solidFill>
@@ -11590,7 +11591,7 @@
             </a:ln>
             <a:extLst>
               <a:ext uri="{91240B29-F687-4f45-9708-019B960494DF}">
-                <a14:hiddenLine xmlns="" xmlns:a14="http://schemas.microsoft.com/office/drawing/2010/main" w="9525">
+                <a14:hiddenLine xmlns:a14="http://schemas.microsoft.com/office/drawing/2010/main" xmlns="" w="9525">
                   <a:solidFill>
                     <a:srgbClr val="000000"/>
                   </a:solidFill>
@@ -11823,7 +11824,7 @@
             </a:ln>
             <a:extLst>
               <a:ext uri="{91240B29-F687-4f45-9708-019B960494DF}">
-                <a14:hiddenLine xmlns="" xmlns:a14="http://schemas.microsoft.com/office/drawing/2010/main" w="9525">
+                <a14:hiddenLine xmlns:a14="http://schemas.microsoft.com/office/drawing/2010/main" xmlns="" w="9525">
                   <a:solidFill>
                     <a:srgbClr val="000000"/>
                   </a:solidFill>
@@ -12076,7 +12077,7 @@
             </a:ln>
             <a:extLst>
               <a:ext uri="{91240B29-F687-4f45-9708-019B960494DF}">
-                <a14:hiddenLine xmlns="" xmlns:a14="http://schemas.microsoft.com/office/drawing/2010/main" w="9525">
+                <a14:hiddenLine xmlns:a14="http://schemas.microsoft.com/office/drawing/2010/main" xmlns="" w="9525">
                   <a:solidFill>
                     <a:srgbClr val="000000"/>
                   </a:solidFill>
@@ -12329,7 +12330,7 @@
             </a:ln>
             <a:extLst>
               <a:ext uri="{91240B29-F687-4f45-9708-019B960494DF}">
-                <a14:hiddenLine xmlns="" xmlns:a14="http://schemas.microsoft.com/office/drawing/2010/main" w="9525">
+                <a14:hiddenLine xmlns:a14="http://schemas.microsoft.com/office/drawing/2010/main" xmlns="" w="9525">
                   <a:solidFill>
                     <a:srgbClr val="000000"/>
                   </a:solidFill>
@@ -12484,7 +12485,7 @@
             </a:ln>
             <a:extLst>
               <a:ext uri="{91240B29-F687-4f45-9708-019B960494DF}">
-                <a14:hiddenLine xmlns="" xmlns:a14="http://schemas.microsoft.com/office/drawing/2010/main" w="9525">
+                <a14:hiddenLine xmlns:a14="http://schemas.microsoft.com/office/drawing/2010/main" xmlns="" w="9525">
                   <a:solidFill>
                     <a:srgbClr val="000000"/>
                   </a:solidFill>
@@ -12858,7 +12859,7 @@
           <a:graphicData uri="http://schemas.openxmlformats.org/presentationml/2006/ole">
             <mc:AlternateContent xmlns:mc="http://schemas.openxmlformats.org/markup-compatibility/2006">
               <mc:Choice xmlns:v="urn:schemas-microsoft-com:vml" Requires="v">
-                <p:oleObj spid="_x0000_s93452" name="think-cell Slide" r:id="rId5" imgW="270" imgH="270" progId="TCLayout.ActiveDocument.1">
+                <p:oleObj spid="_x0000_s93454" name="think-cell Slide" r:id="rId5" imgW="270" imgH="270" progId="TCLayout.ActiveDocument.1">
                   <p:embed/>
                 </p:oleObj>
               </mc:Choice>
@@ -13504,7 +13505,7 @@
             </a:ln>
             <a:extLst>
               <a:ext uri="{91240B29-F687-4f45-9708-019B960494DF}">
-                <a14:hiddenLine xmlns="" xmlns:a14="http://schemas.microsoft.com/office/drawing/2010/main" w="9525">
+                <a14:hiddenLine xmlns:a14="http://schemas.microsoft.com/office/drawing/2010/main" xmlns="" w="9525">
                   <a:solidFill>
                     <a:srgbClr val="000000"/>
                   </a:solidFill>
@@ -13896,7 +13897,7 @@
             </a:ln>
             <a:extLst>
               <a:ext uri="{91240B29-F687-4f45-9708-019B960494DF}">
-                <a14:hiddenLine xmlns="" xmlns:a14="http://schemas.microsoft.com/office/drawing/2010/main" w="9525">
+                <a14:hiddenLine xmlns:a14="http://schemas.microsoft.com/office/drawing/2010/main" xmlns="" w="9525">
                   <a:solidFill>
                     <a:srgbClr val="000000"/>
                   </a:solidFill>
@@ -14220,7 +14221,7 @@
             </a:ln>
             <a:extLst>
               <a:ext uri="{91240B29-F687-4f45-9708-019B960494DF}">
-                <a14:hiddenLine xmlns="" xmlns:a14="http://schemas.microsoft.com/office/drawing/2010/main" w="9525">
+                <a14:hiddenLine xmlns:a14="http://schemas.microsoft.com/office/drawing/2010/main" xmlns="" w="9525">
                   <a:solidFill>
                     <a:srgbClr val="000000"/>
                   </a:solidFill>
@@ -14544,7 +14545,7 @@
             </a:ln>
             <a:extLst>
               <a:ext uri="{91240B29-F687-4f45-9708-019B960494DF}">
-                <a14:hiddenLine xmlns="" xmlns:a14="http://schemas.microsoft.com/office/drawing/2010/main" w="9525">
+                <a14:hiddenLine xmlns:a14="http://schemas.microsoft.com/office/drawing/2010/main" xmlns="" w="9525">
                   <a:solidFill>
                     <a:srgbClr val="000000"/>
                   </a:solidFill>
@@ -14737,7 +14738,7 @@
             </a:ln>
             <a:extLst>
               <a:ext uri="{91240B29-F687-4f45-9708-019B960494DF}">
-                <a14:hiddenLine xmlns="" xmlns:a14="http://schemas.microsoft.com/office/drawing/2010/main" w="9525">
+                <a14:hiddenLine xmlns:a14="http://schemas.microsoft.com/office/drawing/2010/main" xmlns="" w="9525">
                   <a:solidFill>
                     <a:srgbClr val="000000"/>
                   </a:solidFill>
@@ -15129,7 +15130,7 @@
             </a:ln>
             <a:extLst>
               <a:ext uri="{91240B29-F687-4f45-9708-019B960494DF}">
-                <a14:hiddenLine xmlns="" xmlns:a14="http://schemas.microsoft.com/office/drawing/2010/main" w="9525">
+                <a14:hiddenLine xmlns:a14="http://schemas.microsoft.com/office/drawing/2010/main" xmlns="" w="9525">
                   <a:solidFill>
                     <a:srgbClr val="000000"/>
                   </a:solidFill>
@@ -15512,7 +15513,7 @@
             </a:ln>
             <a:extLst>
               <a:ext uri="{91240B29-F687-4f45-9708-019B960494DF}">
-                <a14:hiddenLine xmlns="" xmlns:a14="http://schemas.microsoft.com/office/drawing/2010/main" w="9525">
+                <a14:hiddenLine xmlns:a14="http://schemas.microsoft.com/office/drawing/2010/main" xmlns="" w="9525">
                   <a:solidFill>
                     <a:srgbClr val="000000"/>
                   </a:solidFill>
@@ -15966,7 +15967,7 @@
             </a:ln>
             <a:extLst>
               <a:ext uri="{91240B29-F687-4f45-9708-019B960494DF}">
-                <a14:hiddenLine xmlns="" xmlns:a14="http://schemas.microsoft.com/office/drawing/2010/main" w="9525">
+                <a14:hiddenLine xmlns:a14="http://schemas.microsoft.com/office/drawing/2010/main" xmlns="" w="9525">
                   <a:solidFill>
                     <a:srgbClr val="000000"/>
                   </a:solidFill>
@@ -16219,7 +16220,7 @@
             </a:ln>
             <a:extLst>
               <a:ext uri="{91240B29-F687-4f45-9708-019B960494DF}">
-                <a14:hiddenLine xmlns="" xmlns:a14="http://schemas.microsoft.com/office/drawing/2010/main" w="9525">
+                <a14:hiddenLine xmlns:a14="http://schemas.microsoft.com/office/drawing/2010/main" xmlns="" w="9525">
                   <a:solidFill>
                     <a:srgbClr val="000000"/>
                   </a:solidFill>
@@ -16472,7 +16473,7 @@
             </a:ln>
             <a:extLst>
               <a:ext uri="{91240B29-F687-4f45-9708-019B960494DF}">
-                <a14:hiddenLine xmlns="" xmlns:a14="http://schemas.microsoft.com/office/drawing/2010/main" w="9525">
+                <a14:hiddenLine xmlns:a14="http://schemas.microsoft.com/office/drawing/2010/main" xmlns="" w="9525">
                   <a:solidFill>
                     <a:srgbClr val="000000"/>
                   </a:solidFill>
@@ -16864,7 +16865,7 @@
             </a:ln>
             <a:extLst>
               <a:ext uri="{91240B29-F687-4f45-9708-019B960494DF}">
-                <a14:hiddenLine xmlns="" xmlns:a14="http://schemas.microsoft.com/office/drawing/2010/main" w="9525">
+                <a14:hiddenLine xmlns:a14="http://schemas.microsoft.com/office/drawing/2010/main" xmlns="" w="9525">
                   <a:solidFill>
                     <a:srgbClr val="000000"/>
                   </a:solidFill>
@@ -17077,7 +17078,7 @@
             </a:ln>
             <a:extLst>
               <a:ext uri="{91240B29-F687-4f45-9708-019B960494DF}">
-                <a14:hiddenLine xmlns="" xmlns:a14="http://schemas.microsoft.com/office/drawing/2010/main" w="9525">
+                <a14:hiddenLine xmlns:a14="http://schemas.microsoft.com/office/drawing/2010/main" xmlns="" w="9525">
                   <a:solidFill>
                     <a:srgbClr val="000000"/>
                   </a:solidFill>
@@ -17250,7 +17251,7 @@
             </a:ln>
             <a:extLst>
               <a:ext uri="{91240B29-F687-4f45-9708-019B960494DF}">
-                <a14:hiddenLine xmlns="" xmlns:a14="http://schemas.microsoft.com/office/drawing/2010/main" w="9525">
+                <a14:hiddenLine xmlns:a14="http://schemas.microsoft.com/office/drawing/2010/main" xmlns="" w="9525">
                   <a:solidFill>
                     <a:srgbClr val="000000"/>
                   </a:solidFill>
@@ -17463,7 +17464,7 @@
             </a:ln>
             <a:extLst>
               <a:ext uri="{91240B29-F687-4f45-9708-019B960494DF}">
-                <a14:hiddenLine xmlns="" xmlns:a14="http://schemas.microsoft.com/office/drawing/2010/main" w="9525">
+                <a14:hiddenLine xmlns:a14="http://schemas.microsoft.com/office/drawing/2010/main" xmlns="" w="9525">
                   <a:solidFill>
                     <a:srgbClr val="000000"/>
                   </a:solidFill>
@@ -17855,7 +17856,7 @@
             </a:ln>
             <a:extLst>
               <a:ext uri="{91240B29-F687-4f45-9708-019B960494DF}">
-                <a14:hiddenLine xmlns="" xmlns:a14="http://schemas.microsoft.com/office/drawing/2010/main" w="9525">
+                <a14:hiddenLine xmlns:a14="http://schemas.microsoft.com/office/drawing/2010/main" xmlns="" w="9525">
                   <a:solidFill>
                     <a:srgbClr val="000000"/>
                   </a:solidFill>
@@ -18250,7 +18251,7 @@
             </a:ln>
             <a:extLst>
               <a:ext uri="{91240B29-F687-4f45-9708-019B960494DF}">
-                <a14:hiddenLine xmlns="" xmlns:a14="http://schemas.microsoft.com/office/drawing/2010/main" w="9525">
+                <a14:hiddenLine xmlns:a14="http://schemas.microsoft.com/office/drawing/2010/main" xmlns="" w="9525">
                   <a:solidFill>
                     <a:srgbClr val="000000"/>
                   </a:solidFill>
@@ -18483,7 +18484,7 @@
             </a:ln>
             <a:extLst>
               <a:ext uri="{91240B29-F687-4f45-9708-019B960494DF}">
-                <a14:hiddenLine xmlns="" xmlns:a14="http://schemas.microsoft.com/office/drawing/2010/main" w="9525">
+                <a14:hiddenLine xmlns:a14="http://schemas.microsoft.com/office/drawing/2010/main" xmlns="" w="9525">
                   <a:solidFill>
                     <a:srgbClr val="000000"/>
                   </a:solidFill>
@@ -18676,7 +18677,7 @@
             </a:ln>
             <a:extLst>
               <a:ext uri="{91240B29-F687-4f45-9708-019B960494DF}">
-                <a14:hiddenLine xmlns="" xmlns:a14="http://schemas.microsoft.com/office/drawing/2010/main" w="9525">
+                <a14:hiddenLine xmlns:a14="http://schemas.microsoft.com/office/drawing/2010/main" xmlns="" w="9525">
                   <a:solidFill>
                     <a:srgbClr val="000000"/>
                   </a:solidFill>
@@ -18929,7 +18930,7 @@
             </a:ln>
             <a:extLst>
               <a:ext uri="{91240B29-F687-4f45-9708-019B960494DF}">
-                <a14:hiddenLine xmlns="" xmlns:a14="http://schemas.microsoft.com/office/drawing/2010/main" w="9525">
+                <a14:hiddenLine xmlns:a14="http://schemas.microsoft.com/office/drawing/2010/main" xmlns="" w="9525">
                   <a:solidFill>
                     <a:srgbClr val="000000"/>
                   </a:solidFill>
@@ -19324,7 +19325,7 @@
             </a:ln>
             <a:extLst>
               <a:ext uri="{91240B29-F687-4f45-9708-019B960494DF}">
-                <a14:hiddenLine xmlns="" xmlns:a14="http://schemas.microsoft.com/office/drawing/2010/main" w="9525">
+                <a14:hiddenLine xmlns:a14="http://schemas.microsoft.com/office/drawing/2010/main" xmlns="" w="9525">
                   <a:solidFill>
                     <a:srgbClr val="000000"/>
                   </a:solidFill>
@@ -19609,7 +19610,7 @@
             </a:ln>
             <a:extLst>
               <a:ext uri="{91240B29-F687-4f45-9708-019B960494DF}">
-                <a14:hiddenLine xmlns="" xmlns:a14="http://schemas.microsoft.com/office/drawing/2010/main" w="9525">
+                <a14:hiddenLine xmlns:a14="http://schemas.microsoft.com/office/drawing/2010/main" xmlns="" w="9525">
                   <a:solidFill>
                     <a:srgbClr val="000000"/>
                   </a:solidFill>
@@ -19933,7 +19934,7 @@
             </a:ln>
             <a:extLst>
               <a:ext uri="{91240B29-F687-4f45-9708-019B960494DF}">
-                <a14:hiddenLine xmlns="" xmlns:a14="http://schemas.microsoft.com/office/drawing/2010/main" w="9525">
+                <a14:hiddenLine xmlns:a14="http://schemas.microsoft.com/office/drawing/2010/main" xmlns="" w="9525">
                   <a:solidFill>
                     <a:srgbClr val="000000"/>
                   </a:solidFill>
@@ -20166,7 +20167,7 @@
             </a:ln>
             <a:extLst>
               <a:ext uri="{91240B29-F687-4f45-9708-019B960494DF}">
-                <a14:hiddenLine xmlns="" xmlns:a14="http://schemas.microsoft.com/office/drawing/2010/main" w="9525">
+                <a14:hiddenLine xmlns:a14="http://schemas.microsoft.com/office/drawing/2010/main" xmlns="" w="9525">
                   <a:solidFill>
                     <a:srgbClr val="000000"/>
                   </a:solidFill>
@@ -20419,7 +20420,7 @@
             </a:ln>
             <a:extLst>
               <a:ext uri="{91240B29-F687-4f45-9708-019B960494DF}">
-                <a14:hiddenLine xmlns="" xmlns:a14="http://schemas.microsoft.com/office/drawing/2010/main" w="9525">
+                <a14:hiddenLine xmlns:a14="http://schemas.microsoft.com/office/drawing/2010/main" xmlns="" w="9525">
                   <a:solidFill>
                     <a:srgbClr val="000000"/>
                   </a:solidFill>
@@ -20672,7 +20673,7 @@
             </a:ln>
             <a:extLst>
               <a:ext uri="{91240B29-F687-4f45-9708-019B960494DF}">
-                <a14:hiddenLine xmlns="" xmlns:a14="http://schemas.microsoft.com/office/drawing/2010/main" w="9525">
+                <a14:hiddenLine xmlns:a14="http://schemas.microsoft.com/office/drawing/2010/main" xmlns="" w="9525">
                   <a:solidFill>
                     <a:srgbClr val="000000"/>
                   </a:solidFill>
@@ -20827,7 +20828,7 @@
             </a:ln>
             <a:extLst>
               <a:ext uri="{91240B29-F687-4f45-9708-019B960494DF}">
-                <a14:hiddenLine xmlns="" xmlns:a14="http://schemas.microsoft.com/office/drawing/2010/main" w="9525">
+                <a14:hiddenLine xmlns:a14="http://schemas.microsoft.com/office/drawing/2010/main" xmlns="" w="9525">
                   <a:solidFill>
                     <a:srgbClr val="000000"/>
                   </a:solidFill>
@@ -21310,7 +21311,7 @@
           <a:graphicData uri="http://schemas.openxmlformats.org/presentationml/2006/ole">
             <mc:AlternateContent xmlns:mc="http://schemas.openxmlformats.org/markup-compatibility/2006">
               <mc:Choice xmlns:v="urn:schemas-microsoft-com:vml" Requires="v">
-                <p:oleObj spid="_x0000_s110742" name="think-cell Slide" r:id="rId4" imgW="270" imgH="270" progId="TCLayout.ActiveDocument.1">
+                <p:oleObj spid="_x0000_s110744" name="think-cell Slide" r:id="rId4" imgW="270" imgH="270" progId="TCLayout.ActiveDocument.1">
                   <p:embed/>
                 </p:oleObj>
               </mc:Choice>
@@ -21501,7 +21502,7 @@
           <a:graphicData uri="http://schemas.openxmlformats.org/presentationml/2006/ole">
             <mc:AlternateContent xmlns:mc="http://schemas.openxmlformats.org/markup-compatibility/2006">
               <mc:Choice xmlns:v="urn:schemas-microsoft-com:vml" Requires="v">
-                <p:oleObj spid="_x0000_s111745" name="think-cell Slide" r:id="rId4" imgW="270" imgH="270" progId="TCLayout.ActiveDocument.1">
+                <p:oleObj spid="_x0000_s111747" name="think-cell Slide" r:id="rId4" imgW="270" imgH="270" progId="TCLayout.ActiveDocument.1">
                   <p:embed/>
                 </p:oleObj>
               </mc:Choice>
@@ -22212,7 +22213,7 @@
           <a:graphicData uri="http://schemas.openxmlformats.org/presentationml/2006/ole">
             <mc:AlternateContent xmlns:mc="http://schemas.openxmlformats.org/markup-compatibility/2006">
               <mc:Choice xmlns:v="urn:schemas-microsoft-com:vml" Requires="v">
-                <p:oleObj spid="_x0000_s94474" name="think-cell Slide" r:id="rId4" imgW="270" imgH="270" progId="TCLayout.ActiveDocument.1">
+                <p:oleObj spid="_x0000_s94476" name="think-cell Slide" r:id="rId4" imgW="270" imgH="270" progId="TCLayout.ActiveDocument.1">
                   <p:embed/>
                 </p:oleObj>
               </mc:Choice>
@@ -22844,7 +22845,7 @@
           <a:graphicData uri="http://schemas.openxmlformats.org/presentationml/2006/ole">
             <mc:AlternateContent xmlns:mc="http://schemas.openxmlformats.org/markup-compatibility/2006">
               <mc:Choice xmlns:v="urn:schemas-microsoft-com:vml" Requires="v">
-                <p:oleObj spid="_x0000_s106664" name="think-cell Slide" r:id="rId4" imgW="270" imgH="270" progId="TCLayout.ActiveDocument.1">
+                <p:oleObj spid="_x0000_s106666" name="think-cell Slide" r:id="rId4" imgW="270" imgH="270" progId="TCLayout.ActiveDocument.1">
                   <p:embed/>
                 </p:oleObj>
               </mc:Choice>
@@ -22956,7 +22957,7 @@
           <a:graphicData uri="http://schemas.openxmlformats.org/presentationml/2006/ole">
             <mc:AlternateContent xmlns:mc="http://schemas.openxmlformats.org/markup-compatibility/2006">
               <mc:Choice xmlns:v="urn:schemas-microsoft-com:vml" Requires="v">
-                <p:oleObj spid="_x0000_s109722" name="think-cell Slide" r:id="rId4" imgW="270" imgH="270" progId="TCLayout.ActiveDocument.1">
+                <p:oleObj spid="_x0000_s109724" name="think-cell Slide" r:id="rId4" imgW="270" imgH="270" progId="TCLayout.ActiveDocument.1">
                   <p:embed/>
                 </p:oleObj>
               </mc:Choice>
@@ -23070,7 +23071,7 @@
           <a:graphicData uri="http://schemas.openxmlformats.org/presentationml/2006/ole">
             <mc:AlternateContent xmlns:mc="http://schemas.openxmlformats.org/markup-compatibility/2006">
               <mc:Choice xmlns:v="urn:schemas-microsoft-com:vml" Requires="v">
-                <p:oleObj spid="_x0000_s4603" name="think-cell Slide" r:id="rId18" imgW="270" imgH="270" progId="TCLayout.ActiveDocument.1">
+                <p:oleObj spid="_x0000_s4605" name="think-cell Slide" r:id="rId18" imgW="270" imgH="270" progId="TCLayout.ActiveDocument.1">
                   <p:embed/>
                 </p:oleObj>
               </mc:Choice>
@@ -25532,7 +25533,7 @@
           <a:graphicData uri="http://schemas.openxmlformats.org/presentationml/2006/ole">
             <mc:AlternateContent xmlns:mc="http://schemas.openxmlformats.org/markup-compatibility/2006">
               <mc:Choice xmlns:v="urn:schemas-microsoft-com:vml" Requires="v">
-                <p:oleObj spid="_x0000_s91406" name="think-cell Slide" r:id="rId6" imgW="270" imgH="270" progId="TCLayout.ActiveDocument.1">
+                <p:oleObj spid="_x0000_s91408" name="think-cell Slide" r:id="rId6" imgW="270" imgH="270" progId="TCLayout.ActiveDocument.1">
                   <p:embed/>
                 </p:oleObj>
               </mc:Choice>
@@ -28969,6 +28970,111 @@
             </a:r>
             <a:r>
               <a:rPr lang="nl-NL" dirty="0"/>
+              <a:t> : Lab01</a:t>
+            </a:r>
+          </a:p>
+        </p:txBody>
+      </p:sp>
+      <p:pic>
+        <p:nvPicPr>
+          <p:cNvPr id="8" name="Picture 7">
+            <a:extLst>
+              <a:ext uri="{FF2B5EF4-FFF2-40B4-BE49-F238E27FC236}">
+                <a16:creationId xmlns:a16="http://schemas.microsoft.com/office/drawing/2014/main" id="{6AD0CFBE-6CD0-4179-9100-80043C24442A}"/>
+              </a:ext>
+            </a:extLst>
+          </p:cNvPr>
+          <p:cNvPicPr>
+            <a:picLocks noChangeAspect="1"/>
+          </p:cNvPicPr>
+          <p:nvPr/>
+        </p:nvPicPr>
+        <p:blipFill>
+          <a:blip r:embed="rId2"/>
+          <a:stretch>
+            <a:fillRect/>
+          </a:stretch>
+        </p:blipFill>
+        <p:spPr>
+          <a:xfrm>
+            <a:off x="550200" y="1052736"/>
+            <a:ext cx="10496545" cy="5496157"/>
+          </a:xfrm>
+          <a:prstGeom prst="rect">
+            <a:avLst/>
+          </a:prstGeom>
+        </p:spPr>
+      </p:pic>
+    </p:spTree>
+    <p:extLst>
+      <p:ext uri="{BB962C8B-B14F-4D97-AF65-F5344CB8AC3E}">
+        <p14:creationId xmlns:p14="http://schemas.microsoft.com/office/powerpoint/2010/main" val="2112031513"/>
+      </p:ext>
+    </p:extLst>
+  </p:cSld>
+  <p:clrMapOvr>
+    <a:masterClrMapping/>
+  </p:clrMapOvr>
+</p:sld>
+</file>
+
+<file path=ppt/slides/slide6.xml><?xml version="1.0" encoding="utf-8"?>
+<p:sld xmlns:a="http://schemas.openxmlformats.org/drawingml/2006/main" xmlns:r="http://schemas.openxmlformats.org/officeDocument/2006/relationships" xmlns:p="http://schemas.openxmlformats.org/presentationml/2006/main">
+  <p:cSld>
+    <p:spTree>
+      <p:nvGrpSpPr>
+        <p:cNvPr id="1" name=""/>
+        <p:cNvGrpSpPr/>
+        <p:nvPr/>
+      </p:nvGrpSpPr>
+      <p:grpSpPr>
+        <a:xfrm>
+          <a:off x="0" y="0"/>
+          <a:ext cx="0" cy="0"/>
+          <a:chOff x="0" y="0"/>
+          <a:chExt cx="0" cy="0"/>
+        </a:xfrm>
+      </p:grpSpPr>
+      <p:sp>
+        <p:nvSpPr>
+          <p:cNvPr id="2" name="Title 1">
+            <a:extLst>
+              <a:ext uri="{FF2B5EF4-FFF2-40B4-BE49-F238E27FC236}">
+                <a16:creationId xmlns:a16="http://schemas.microsoft.com/office/drawing/2014/main" id="{1743C244-29DB-4467-8119-97FEE9B69BF8}"/>
+              </a:ext>
+            </a:extLst>
+          </p:cNvPr>
+          <p:cNvSpPr>
+            <a:spLocks noGrp="1"/>
+          </p:cNvSpPr>
+          <p:nvPr>
+            <p:ph type="title"/>
+          </p:nvPr>
+        </p:nvSpPr>
+        <p:spPr>
+          <a:xfrm>
+            <a:off x="550200" y="188640"/>
+            <a:ext cx="11091600" cy="916260"/>
+          </a:xfrm>
+        </p:spPr>
+        <p:txBody>
+          <a:bodyPr/>
+          <a:lstStyle/>
+          <a:p>
+            <a:r>
+              <a:rPr lang="nl-NL" dirty="0" err="1"/>
+              <a:t>Azure</a:t>
+            </a:r>
+            <a:r>
+              <a:rPr lang="nl-NL" dirty="0"/>
+              <a:t> </a:t>
+            </a:r>
+            <a:r>
+              <a:rPr lang="nl-NL" dirty="0" err="1"/>
+              <a:t>Function</a:t>
+            </a:r>
+            <a:r>
+              <a:rPr lang="nl-NL" dirty="0"/>
               <a:t> </a:t>
             </a:r>
             <a:r>
@@ -29460,7 +29566,7 @@
     </p:spTree>
     <p:extLst>
       <p:ext uri="{BB962C8B-B14F-4D97-AF65-F5344CB8AC3E}">
-        <p14:creationId xmlns:p14="http://schemas.microsoft.com/office/powerpoint/2010/main" val="2112031513"/>
+        <p14:creationId xmlns:p14="http://schemas.microsoft.com/office/powerpoint/2010/main" val="1821772317"/>
       </p:ext>
     </p:extLst>
   </p:cSld>

</xml_diff>

<commit_message>
added gif for quickly create functionapp from VScode
</commit_message>
<xml_diff>
--- a/Azure-Function-203.pptx
+++ b/Azure-Function-203.pptx
@@ -265,7 +265,7 @@
             <a:fld id="{86C988DC-9DE3-4390-97AB-D61B85DACE57}" type="datetimeFigureOut">
               <a:rPr lang="pt-PT" sz="900" smtClean="0"/>
               <a:pPr/>
-              <a:t>26/08/2019</a:t>
+              <a:t>28/08/2019</a:t>
             </a:fld>
             <a:endParaRPr lang="pt-PT" sz="900"/>
           </a:p>
@@ -444,7 +444,7 @@
             <a:fld id="{0835B8F7-DAC4-4931-8AED-4356A8B2FD64}" type="datetimeFigureOut">
               <a:rPr lang="pt-BR" smtClean="0"/>
               <a:pPr/>
-              <a:t>26/08/2019</a:t>
+              <a:t>28/08/2019</a:t>
             </a:fld>
             <a:endParaRPr lang="pt-BR"/>
           </a:p>
@@ -1456,7 +1456,7 @@
           <a:graphicData uri="http://schemas.openxmlformats.org/presentationml/2006/ole">
             <mc:AlternateContent xmlns:mc="http://schemas.openxmlformats.org/markup-compatibility/2006">
               <mc:Choice xmlns:v="urn:schemas-microsoft-com:vml" Requires="v">
-                <p:oleObj spid="_x0000_s9712" name="think-cell Slide" r:id="rId4" imgW="270" imgH="270" progId="TCLayout.ActiveDocument.1">
+                <p:oleObj spid="_x0000_s9718" name="think-cell Slide" r:id="rId4" imgW="270" imgH="270" progId="TCLayout.ActiveDocument.1">
                   <p:embed/>
                 </p:oleObj>
               </mc:Choice>
@@ -1593,7 +1593,7 @@
           <a:graphicData uri="http://schemas.openxmlformats.org/presentationml/2006/ole">
             <mc:AlternateContent xmlns:mc="http://schemas.openxmlformats.org/markup-compatibility/2006">
               <mc:Choice xmlns:v="urn:schemas-microsoft-com:vml" Requires="v">
-                <p:oleObj spid="_x0000_s112778" name="think-cell Slide" r:id="rId4" imgW="270" imgH="270" progId="TCLayout.ActiveDocument.1">
+                <p:oleObj spid="_x0000_s112784" name="think-cell Slide" r:id="rId4" imgW="270" imgH="270" progId="TCLayout.ActiveDocument.1">
                   <p:embed/>
                 </p:oleObj>
               </mc:Choice>
@@ -2065,7 +2065,7 @@
           <a:graphicData uri="http://schemas.openxmlformats.org/presentationml/2006/ole">
             <mc:AlternateContent xmlns:mc="http://schemas.openxmlformats.org/markup-compatibility/2006">
               <mc:Choice xmlns:v="urn:schemas-microsoft-com:vml" Requires="v">
-                <p:oleObj spid="_x0000_s103617" name="think-cell Slide" r:id="rId4" imgW="270" imgH="270" progId="TCLayout.ActiveDocument.1">
+                <p:oleObj spid="_x0000_s103623" name="think-cell Slide" r:id="rId4" imgW="270" imgH="270" progId="TCLayout.ActiveDocument.1">
                   <p:embed/>
                 </p:oleObj>
               </mc:Choice>
@@ -2267,7 +2267,7 @@
           <a:graphicData uri="http://schemas.openxmlformats.org/presentationml/2006/ole">
             <mc:AlternateContent xmlns:mc="http://schemas.openxmlformats.org/markup-compatibility/2006">
               <mc:Choice xmlns:v="urn:schemas-microsoft-com:vml" Requires="v">
-                <p:oleObj spid="_x0000_s108722" name="think-cell Slide" r:id="rId4" imgW="270" imgH="270" progId="TCLayout.ActiveDocument.1">
+                <p:oleObj spid="_x0000_s108728" name="think-cell Slide" r:id="rId4" imgW="270" imgH="270" progId="TCLayout.ActiveDocument.1">
                   <p:embed/>
                 </p:oleObj>
               </mc:Choice>
@@ -2469,7 +2469,7 @@
           <a:graphicData uri="http://schemas.openxmlformats.org/presentationml/2006/ole">
             <mc:AlternateContent xmlns:mc="http://schemas.openxmlformats.org/markup-compatibility/2006">
               <mc:Choice xmlns:v="urn:schemas-microsoft-com:vml" Requires="v">
-                <p:oleObj spid="_x0000_s97535" name="think-cell Slide" r:id="rId4" imgW="270" imgH="270" progId="TCLayout.ActiveDocument.1">
+                <p:oleObj spid="_x0000_s97541" name="think-cell Slide" r:id="rId4" imgW="270" imgH="270" progId="TCLayout.ActiveDocument.1">
                   <p:embed/>
                 </p:oleObj>
               </mc:Choice>
@@ -3703,7 +3703,7 @@
           <a:graphicData uri="http://schemas.openxmlformats.org/presentationml/2006/ole">
             <mc:AlternateContent xmlns:mc="http://schemas.openxmlformats.org/markup-compatibility/2006">
               <mc:Choice xmlns:v="urn:schemas-microsoft-com:vml" Requires="v">
-                <p:oleObj spid="_x0000_s92454" name="think-cell Slide" r:id="rId5" imgW="270" imgH="270" progId="TCLayout.ActiveDocument.1">
+                <p:oleObj spid="_x0000_s92460" name="think-cell Slide" r:id="rId5" imgW="270" imgH="270" progId="TCLayout.ActiveDocument.1">
                   <p:embed/>
                 </p:oleObj>
               </mc:Choice>
@@ -4399,7 +4399,7 @@
             </a:ln>
             <a:extLst>
               <a:ext uri="{91240B29-F687-4f45-9708-019B960494DF}">
-                <a14:hiddenLine xmlns="" xmlns:a14="http://schemas.microsoft.com/office/drawing/2010/main" w="9525">
+                <a14:hiddenLine xmlns:a14="http://schemas.microsoft.com/office/drawing/2010/main" xmlns="" w="9525">
                   <a:solidFill>
                     <a:srgbClr val="000000"/>
                   </a:solidFill>
@@ -4791,7 +4791,7 @@
             </a:ln>
             <a:extLst>
               <a:ext uri="{91240B29-F687-4f45-9708-019B960494DF}">
-                <a14:hiddenLine xmlns="" xmlns:a14="http://schemas.microsoft.com/office/drawing/2010/main" w="9525">
+                <a14:hiddenLine xmlns:a14="http://schemas.microsoft.com/office/drawing/2010/main" xmlns="" w="9525">
                   <a:solidFill>
                     <a:srgbClr val="000000"/>
                   </a:solidFill>
@@ -5115,7 +5115,7 @@
             </a:ln>
             <a:extLst>
               <a:ext uri="{91240B29-F687-4f45-9708-019B960494DF}">
-                <a14:hiddenLine xmlns="" xmlns:a14="http://schemas.microsoft.com/office/drawing/2010/main" w="9525">
+                <a14:hiddenLine xmlns:a14="http://schemas.microsoft.com/office/drawing/2010/main" xmlns="" w="9525">
                   <a:solidFill>
                     <a:srgbClr val="000000"/>
                   </a:solidFill>
@@ -5439,7 +5439,7 @@
             </a:ln>
             <a:extLst>
               <a:ext uri="{91240B29-F687-4f45-9708-019B960494DF}">
-                <a14:hiddenLine xmlns="" xmlns:a14="http://schemas.microsoft.com/office/drawing/2010/main" w="9525">
+                <a14:hiddenLine xmlns:a14="http://schemas.microsoft.com/office/drawing/2010/main" xmlns="" w="9525">
                   <a:solidFill>
                     <a:srgbClr val="000000"/>
                   </a:solidFill>
@@ -5632,7 +5632,7 @@
             </a:ln>
             <a:extLst>
               <a:ext uri="{91240B29-F687-4f45-9708-019B960494DF}">
-                <a14:hiddenLine xmlns="" xmlns:a14="http://schemas.microsoft.com/office/drawing/2010/main" w="9525">
+                <a14:hiddenLine xmlns:a14="http://schemas.microsoft.com/office/drawing/2010/main" xmlns="" w="9525">
                   <a:solidFill>
                     <a:srgbClr val="000000"/>
                   </a:solidFill>
@@ -6024,7 +6024,7 @@
             </a:ln>
             <a:extLst>
               <a:ext uri="{91240B29-F687-4f45-9708-019B960494DF}">
-                <a14:hiddenLine xmlns="" xmlns:a14="http://schemas.microsoft.com/office/drawing/2010/main" w="9525">
+                <a14:hiddenLine xmlns:a14="http://schemas.microsoft.com/office/drawing/2010/main" xmlns="" w="9525">
                   <a:solidFill>
                     <a:srgbClr val="000000"/>
                   </a:solidFill>
@@ -6407,7 +6407,7 @@
             </a:ln>
             <a:extLst>
               <a:ext uri="{91240B29-F687-4f45-9708-019B960494DF}">
-                <a14:hiddenLine xmlns="" xmlns:a14="http://schemas.microsoft.com/office/drawing/2010/main" w="9525">
+                <a14:hiddenLine xmlns:a14="http://schemas.microsoft.com/office/drawing/2010/main" xmlns="" w="9525">
                   <a:solidFill>
                     <a:srgbClr val="000000"/>
                   </a:solidFill>
@@ -6861,7 +6861,7 @@
             </a:ln>
             <a:extLst>
               <a:ext uri="{91240B29-F687-4f45-9708-019B960494DF}">
-                <a14:hiddenLine xmlns="" xmlns:a14="http://schemas.microsoft.com/office/drawing/2010/main" w="9525">
+                <a14:hiddenLine xmlns:a14="http://schemas.microsoft.com/office/drawing/2010/main" xmlns="" w="9525">
                   <a:solidFill>
                     <a:srgbClr val="000000"/>
                   </a:solidFill>
@@ -7114,7 +7114,7 @@
             </a:ln>
             <a:extLst>
               <a:ext uri="{91240B29-F687-4f45-9708-019B960494DF}">
-                <a14:hiddenLine xmlns="" xmlns:a14="http://schemas.microsoft.com/office/drawing/2010/main" w="9525">
+                <a14:hiddenLine xmlns:a14="http://schemas.microsoft.com/office/drawing/2010/main" xmlns="" w="9525">
                   <a:solidFill>
                     <a:srgbClr val="000000"/>
                   </a:solidFill>
@@ -7367,7 +7367,7 @@
             </a:ln>
             <a:extLst>
               <a:ext uri="{91240B29-F687-4f45-9708-019B960494DF}">
-                <a14:hiddenLine xmlns="" xmlns:a14="http://schemas.microsoft.com/office/drawing/2010/main" w="9525">
+                <a14:hiddenLine xmlns:a14="http://schemas.microsoft.com/office/drawing/2010/main" xmlns="" w="9525">
                   <a:solidFill>
                     <a:srgbClr val="000000"/>
                   </a:solidFill>
@@ -7759,7 +7759,7 @@
             </a:ln>
             <a:extLst>
               <a:ext uri="{91240B29-F687-4f45-9708-019B960494DF}">
-                <a14:hiddenLine xmlns="" xmlns:a14="http://schemas.microsoft.com/office/drawing/2010/main" w="9525">
+                <a14:hiddenLine xmlns:a14="http://schemas.microsoft.com/office/drawing/2010/main" xmlns="" w="9525">
                   <a:solidFill>
                     <a:srgbClr val="000000"/>
                   </a:solidFill>
@@ -7972,7 +7972,7 @@
             </a:ln>
             <a:extLst>
               <a:ext uri="{91240B29-F687-4f45-9708-019B960494DF}">
-                <a14:hiddenLine xmlns="" xmlns:a14="http://schemas.microsoft.com/office/drawing/2010/main" w="9525">
+                <a14:hiddenLine xmlns:a14="http://schemas.microsoft.com/office/drawing/2010/main" xmlns="" w="9525">
                   <a:solidFill>
                     <a:srgbClr val="000000"/>
                   </a:solidFill>
@@ -8145,7 +8145,7 @@
             </a:ln>
             <a:extLst>
               <a:ext uri="{91240B29-F687-4f45-9708-019B960494DF}">
-                <a14:hiddenLine xmlns="" xmlns:a14="http://schemas.microsoft.com/office/drawing/2010/main" w="9525">
+                <a14:hiddenLine xmlns:a14="http://schemas.microsoft.com/office/drawing/2010/main" xmlns="" w="9525">
                   <a:solidFill>
                     <a:srgbClr val="000000"/>
                   </a:solidFill>
@@ -8358,7 +8358,7 @@
             </a:ln>
             <a:extLst>
               <a:ext uri="{91240B29-F687-4f45-9708-019B960494DF}">
-                <a14:hiddenLine xmlns="" xmlns:a14="http://schemas.microsoft.com/office/drawing/2010/main" w="9525">
+                <a14:hiddenLine xmlns:a14="http://schemas.microsoft.com/office/drawing/2010/main" xmlns="" w="9525">
                   <a:solidFill>
                     <a:srgbClr val="000000"/>
                   </a:solidFill>
@@ -8750,7 +8750,7 @@
             </a:ln>
             <a:extLst>
               <a:ext uri="{91240B29-F687-4f45-9708-019B960494DF}">
-                <a14:hiddenLine xmlns="" xmlns:a14="http://schemas.microsoft.com/office/drawing/2010/main" w="9525">
+                <a14:hiddenLine xmlns:a14="http://schemas.microsoft.com/office/drawing/2010/main" xmlns="" w="9525">
                   <a:solidFill>
                     <a:srgbClr val="000000"/>
                   </a:solidFill>
@@ -9145,7 +9145,7 @@
             </a:ln>
             <a:extLst>
               <a:ext uri="{91240B29-F687-4f45-9708-019B960494DF}">
-                <a14:hiddenLine xmlns="" xmlns:a14="http://schemas.microsoft.com/office/drawing/2010/main" w="9525">
+                <a14:hiddenLine xmlns:a14="http://schemas.microsoft.com/office/drawing/2010/main" xmlns="" w="9525">
                   <a:solidFill>
                     <a:srgbClr val="000000"/>
                   </a:solidFill>
@@ -9378,7 +9378,7 @@
             </a:ln>
             <a:extLst>
               <a:ext uri="{91240B29-F687-4f45-9708-019B960494DF}">
-                <a14:hiddenLine xmlns="" xmlns:a14="http://schemas.microsoft.com/office/drawing/2010/main" w="9525">
+                <a14:hiddenLine xmlns:a14="http://schemas.microsoft.com/office/drawing/2010/main" xmlns="" w="9525">
                   <a:solidFill>
                     <a:srgbClr val="000000"/>
                   </a:solidFill>
@@ -9571,7 +9571,7 @@
             </a:ln>
             <a:extLst>
               <a:ext uri="{91240B29-F687-4f45-9708-019B960494DF}">
-                <a14:hiddenLine xmlns="" xmlns:a14="http://schemas.microsoft.com/office/drawing/2010/main" w="9525">
+                <a14:hiddenLine xmlns:a14="http://schemas.microsoft.com/office/drawing/2010/main" xmlns="" w="9525">
                   <a:solidFill>
                     <a:srgbClr val="000000"/>
                   </a:solidFill>
@@ -9824,7 +9824,7 @@
             </a:ln>
             <a:extLst>
               <a:ext uri="{91240B29-F687-4f45-9708-019B960494DF}">
-                <a14:hiddenLine xmlns="" xmlns:a14="http://schemas.microsoft.com/office/drawing/2010/main" w="9525">
+                <a14:hiddenLine xmlns:a14="http://schemas.microsoft.com/office/drawing/2010/main" xmlns="" w="9525">
                   <a:solidFill>
                     <a:srgbClr val="000000"/>
                   </a:solidFill>
@@ -10219,7 +10219,7 @@
             </a:ln>
             <a:extLst>
               <a:ext uri="{91240B29-F687-4f45-9708-019B960494DF}">
-                <a14:hiddenLine xmlns="" xmlns:a14="http://schemas.microsoft.com/office/drawing/2010/main" w="9525">
+                <a14:hiddenLine xmlns:a14="http://schemas.microsoft.com/office/drawing/2010/main" xmlns="" w="9525">
                   <a:solidFill>
                     <a:srgbClr val="000000"/>
                   </a:solidFill>
@@ -10504,7 +10504,7 @@
             </a:ln>
             <a:extLst>
               <a:ext uri="{91240B29-F687-4f45-9708-019B960494DF}">
-                <a14:hiddenLine xmlns="" xmlns:a14="http://schemas.microsoft.com/office/drawing/2010/main" w="9525">
+                <a14:hiddenLine xmlns:a14="http://schemas.microsoft.com/office/drawing/2010/main" xmlns="" w="9525">
                   <a:solidFill>
                     <a:srgbClr val="000000"/>
                   </a:solidFill>
@@ -10828,7 +10828,7 @@
             </a:ln>
             <a:extLst>
               <a:ext uri="{91240B29-F687-4f45-9708-019B960494DF}">
-                <a14:hiddenLine xmlns="" xmlns:a14="http://schemas.microsoft.com/office/drawing/2010/main" w="9525">
+                <a14:hiddenLine xmlns:a14="http://schemas.microsoft.com/office/drawing/2010/main" xmlns="" w="9525">
                   <a:solidFill>
                     <a:srgbClr val="000000"/>
                   </a:solidFill>
@@ -11061,7 +11061,7 @@
             </a:ln>
             <a:extLst>
               <a:ext uri="{91240B29-F687-4f45-9708-019B960494DF}">
-                <a14:hiddenLine xmlns="" xmlns:a14="http://schemas.microsoft.com/office/drawing/2010/main" w="9525">
+                <a14:hiddenLine xmlns:a14="http://schemas.microsoft.com/office/drawing/2010/main" xmlns="" w="9525">
                   <a:solidFill>
                     <a:srgbClr val="000000"/>
                   </a:solidFill>
@@ -11314,7 +11314,7 @@
             </a:ln>
             <a:extLst>
               <a:ext uri="{91240B29-F687-4f45-9708-019B960494DF}">
-                <a14:hiddenLine xmlns="" xmlns:a14="http://schemas.microsoft.com/office/drawing/2010/main" w="9525">
+                <a14:hiddenLine xmlns:a14="http://schemas.microsoft.com/office/drawing/2010/main" xmlns="" w="9525">
                   <a:solidFill>
                     <a:srgbClr val="000000"/>
                   </a:solidFill>
@@ -11567,7 +11567,7 @@
             </a:ln>
             <a:extLst>
               <a:ext uri="{91240B29-F687-4f45-9708-019B960494DF}">
-                <a14:hiddenLine xmlns="" xmlns:a14="http://schemas.microsoft.com/office/drawing/2010/main" w="9525">
+                <a14:hiddenLine xmlns:a14="http://schemas.microsoft.com/office/drawing/2010/main" xmlns="" w="9525">
                   <a:solidFill>
                     <a:srgbClr val="000000"/>
                   </a:solidFill>
@@ -11722,7 +11722,7 @@
             </a:ln>
             <a:extLst>
               <a:ext uri="{91240B29-F687-4f45-9708-019B960494DF}">
-                <a14:hiddenLine xmlns="" xmlns:a14="http://schemas.microsoft.com/office/drawing/2010/main" w="9525">
+                <a14:hiddenLine xmlns:a14="http://schemas.microsoft.com/office/drawing/2010/main" xmlns="" w="9525">
                   <a:solidFill>
                     <a:srgbClr val="000000"/>
                   </a:solidFill>
@@ -12096,7 +12096,7 @@
           <a:graphicData uri="http://schemas.openxmlformats.org/presentationml/2006/ole">
             <mc:AlternateContent xmlns:mc="http://schemas.openxmlformats.org/markup-compatibility/2006">
               <mc:Choice xmlns:v="urn:schemas-microsoft-com:vml" Requires="v">
-                <p:oleObj spid="_x0000_s93475" name="think-cell Slide" r:id="rId5" imgW="270" imgH="270" progId="TCLayout.ActiveDocument.1">
+                <p:oleObj spid="_x0000_s93481" name="think-cell Slide" r:id="rId5" imgW="270" imgH="270" progId="TCLayout.ActiveDocument.1">
                   <p:embed/>
                 </p:oleObj>
               </mc:Choice>
@@ -12742,7 +12742,7 @@
             </a:ln>
             <a:extLst>
               <a:ext uri="{91240B29-F687-4f45-9708-019B960494DF}">
-                <a14:hiddenLine xmlns="" xmlns:a14="http://schemas.microsoft.com/office/drawing/2010/main" w="9525">
+                <a14:hiddenLine xmlns:a14="http://schemas.microsoft.com/office/drawing/2010/main" xmlns="" w="9525">
                   <a:solidFill>
                     <a:srgbClr val="000000"/>
                   </a:solidFill>
@@ -13134,7 +13134,7 @@
             </a:ln>
             <a:extLst>
               <a:ext uri="{91240B29-F687-4f45-9708-019B960494DF}">
-                <a14:hiddenLine xmlns="" xmlns:a14="http://schemas.microsoft.com/office/drawing/2010/main" w="9525">
+                <a14:hiddenLine xmlns:a14="http://schemas.microsoft.com/office/drawing/2010/main" xmlns="" w="9525">
                   <a:solidFill>
                     <a:srgbClr val="000000"/>
                   </a:solidFill>
@@ -13458,7 +13458,7 @@
             </a:ln>
             <a:extLst>
               <a:ext uri="{91240B29-F687-4f45-9708-019B960494DF}">
-                <a14:hiddenLine xmlns="" xmlns:a14="http://schemas.microsoft.com/office/drawing/2010/main" w="9525">
+                <a14:hiddenLine xmlns:a14="http://schemas.microsoft.com/office/drawing/2010/main" xmlns="" w="9525">
                   <a:solidFill>
                     <a:srgbClr val="000000"/>
                   </a:solidFill>
@@ -13782,7 +13782,7 @@
             </a:ln>
             <a:extLst>
               <a:ext uri="{91240B29-F687-4f45-9708-019B960494DF}">
-                <a14:hiddenLine xmlns="" xmlns:a14="http://schemas.microsoft.com/office/drawing/2010/main" w="9525">
+                <a14:hiddenLine xmlns:a14="http://schemas.microsoft.com/office/drawing/2010/main" xmlns="" w="9525">
                   <a:solidFill>
                     <a:srgbClr val="000000"/>
                   </a:solidFill>
@@ -13975,7 +13975,7 @@
             </a:ln>
             <a:extLst>
               <a:ext uri="{91240B29-F687-4f45-9708-019B960494DF}">
-                <a14:hiddenLine xmlns="" xmlns:a14="http://schemas.microsoft.com/office/drawing/2010/main" w="9525">
+                <a14:hiddenLine xmlns:a14="http://schemas.microsoft.com/office/drawing/2010/main" xmlns="" w="9525">
                   <a:solidFill>
                     <a:srgbClr val="000000"/>
                   </a:solidFill>
@@ -14367,7 +14367,7 @@
             </a:ln>
             <a:extLst>
               <a:ext uri="{91240B29-F687-4f45-9708-019B960494DF}">
-                <a14:hiddenLine xmlns="" xmlns:a14="http://schemas.microsoft.com/office/drawing/2010/main" w="9525">
+                <a14:hiddenLine xmlns:a14="http://schemas.microsoft.com/office/drawing/2010/main" xmlns="" w="9525">
                   <a:solidFill>
                     <a:srgbClr val="000000"/>
                   </a:solidFill>
@@ -14750,7 +14750,7 @@
             </a:ln>
             <a:extLst>
               <a:ext uri="{91240B29-F687-4f45-9708-019B960494DF}">
-                <a14:hiddenLine xmlns="" xmlns:a14="http://schemas.microsoft.com/office/drawing/2010/main" w="9525">
+                <a14:hiddenLine xmlns:a14="http://schemas.microsoft.com/office/drawing/2010/main" xmlns="" w="9525">
                   <a:solidFill>
                     <a:srgbClr val="000000"/>
                   </a:solidFill>
@@ -15204,7 +15204,7 @@
             </a:ln>
             <a:extLst>
               <a:ext uri="{91240B29-F687-4f45-9708-019B960494DF}">
-                <a14:hiddenLine xmlns="" xmlns:a14="http://schemas.microsoft.com/office/drawing/2010/main" w="9525">
+                <a14:hiddenLine xmlns:a14="http://schemas.microsoft.com/office/drawing/2010/main" xmlns="" w="9525">
                   <a:solidFill>
                     <a:srgbClr val="000000"/>
                   </a:solidFill>
@@ -15457,7 +15457,7 @@
             </a:ln>
             <a:extLst>
               <a:ext uri="{91240B29-F687-4f45-9708-019B960494DF}">
-                <a14:hiddenLine xmlns="" xmlns:a14="http://schemas.microsoft.com/office/drawing/2010/main" w="9525">
+                <a14:hiddenLine xmlns:a14="http://schemas.microsoft.com/office/drawing/2010/main" xmlns="" w="9525">
                   <a:solidFill>
                     <a:srgbClr val="000000"/>
                   </a:solidFill>
@@ -15710,7 +15710,7 @@
             </a:ln>
             <a:extLst>
               <a:ext uri="{91240B29-F687-4f45-9708-019B960494DF}">
-                <a14:hiddenLine xmlns="" xmlns:a14="http://schemas.microsoft.com/office/drawing/2010/main" w="9525">
+                <a14:hiddenLine xmlns:a14="http://schemas.microsoft.com/office/drawing/2010/main" xmlns="" w="9525">
                   <a:solidFill>
                     <a:srgbClr val="000000"/>
                   </a:solidFill>
@@ -16102,7 +16102,7 @@
             </a:ln>
             <a:extLst>
               <a:ext uri="{91240B29-F687-4f45-9708-019B960494DF}">
-                <a14:hiddenLine xmlns="" xmlns:a14="http://schemas.microsoft.com/office/drawing/2010/main" w="9525">
+                <a14:hiddenLine xmlns:a14="http://schemas.microsoft.com/office/drawing/2010/main" xmlns="" w="9525">
                   <a:solidFill>
                     <a:srgbClr val="000000"/>
                   </a:solidFill>
@@ -16315,7 +16315,7 @@
             </a:ln>
             <a:extLst>
               <a:ext uri="{91240B29-F687-4f45-9708-019B960494DF}">
-                <a14:hiddenLine xmlns="" xmlns:a14="http://schemas.microsoft.com/office/drawing/2010/main" w="9525">
+                <a14:hiddenLine xmlns:a14="http://schemas.microsoft.com/office/drawing/2010/main" xmlns="" w="9525">
                   <a:solidFill>
                     <a:srgbClr val="000000"/>
                   </a:solidFill>
@@ -16488,7 +16488,7 @@
             </a:ln>
             <a:extLst>
               <a:ext uri="{91240B29-F687-4f45-9708-019B960494DF}">
-                <a14:hiddenLine xmlns="" xmlns:a14="http://schemas.microsoft.com/office/drawing/2010/main" w="9525">
+                <a14:hiddenLine xmlns:a14="http://schemas.microsoft.com/office/drawing/2010/main" xmlns="" w="9525">
                   <a:solidFill>
                     <a:srgbClr val="000000"/>
                   </a:solidFill>
@@ -16701,7 +16701,7 @@
             </a:ln>
             <a:extLst>
               <a:ext uri="{91240B29-F687-4f45-9708-019B960494DF}">
-                <a14:hiddenLine xmlns="" xmlns:a14="http://schemas.microsoft.com/office/drawing/2010/main" w="9525">
+                <a14:hiddenLine xmlns:a14="http://schemas.microsoft.com/office/drawing/2010/main" xmlns="" w="9525">
                   <a:solidFill>
                     <a:srgbClr val="000000"/>
                   </a:solidFill>
@@ -17093,7 +17093,7 @@
             </a:ln>
             <a:extLst>
               <a:ext uri="{91240B29-F687-4f45-9708-019B960494DF}">
-                <a14:hiddenLine xmlns="" xmlns:a14="http://schemas.microsoft.com/office/drawing/2010/main" w="9525">
+                <a14:hiddenLine xmlns:a14="http://schemas.microsoft.com/office/drawing/2010/main" xmlns="" w="9525">
                   <a:solidFill>
                     <a:srgbClr val="000000"/>
                   </a:solidFill>
@@ -17488,7 +17488,7 @@
             </a:ln>
             <a:extLst>
               <a:ext uri="{91240B29-F687-4f45-9708-019B960494DF}">
-                <a14:hiddenLine xmlns="" xmlns:a14="http://schemas.microsoft.com/office/drawing/2010/main" w="9525">
+                <a14:hiddenLine xmlns:a14="http://schemas.microsoft.com/office/drawing/2010/main" xmlns="" w="9525">
                   <a:solidFill>
                     <a:srgbClr val="000000"/>
                   </a:solidFill>
@@ -17721,7 +17721,7 @@
             </a:ln>
             <a:extLst>
               <a:ext uri="{91240B29-F687-4f45-9708-019B960494DF}">
-                <a14:hiddenLine xmlns="" xmlns:a14="http://schemas.microsoft.com/office/drawing/2010/main" w="9525">
+                <a14:hiddenLine xmlns:a14="http://schemas.microsoft.com/office/drawing/2010/main" xmlns="" w="9525">
                   <a:solidFill>
                     <a:srgbClr val="000000"/>
                   </a:solidFill>
@@ -17914,7 +17914,7 @@
             </a:ln>
             <a:extLst>
               <a:ext uri="{91240B29-F687-4f45-9708-019B960494DF}">
-                <a14:hiddenLine xmlns="" xmlns:a14="http://schemas.microsoft.com/office/drawing/2010/main" w="9525">
+                <a14:hiddenLine xmlns:a14="http://schemas.microsoft.com/office/drawing/2010/main" xmlns="" w="9525">
                   <a:solidFill>
                     <a:srgbClr val="000000"/>
                   </a:solidFill>
@@ -18167,7 +18167,7 @@
             </a:ln>
             <a:extLst>
               <a:ext uri="{91240B29-F687-4f45-9708-019B960494DF}">
-                <a14:hiddenLine xmlns="" xmlns:a14="http://schemas.microsoft.com/office/drawing/2010/main" w="9525">
+                <a14:hiddenLine xmlns:a14="http://schemas.microsoft.com/office/drawing/2010/main" xmlns="" w="9525">
                   <a:solidFill>
                     <a:srgbClr val="000000"/>
                   </a:solidFill>
@@ -18562,7 +18562,7 @@
             </a:ln>
             <a:extLst>
               <a:ext uri="{91240B29-F687-4f45-9708-019B960494DF}">
-                <a14:hiddenLine xmlns="" xmlns:a14="http://schemas.microsoft.com/office/drawing/2010/main" w="9525">
+                <a14:hiddenLine xmlns:a14="http://schemas.microsoft.com/office/drawing/2010/main" xmlns="" w="9525">
                   <a:solidFill>
                     <a:srgbClr val="000000"/>
                   </a:solidFill>
@@ -18847,7 +18847,7 @@
             </a:ln>
             <a:extLst>
               <a:ext uri="{91240B29-F687-4f45-9708-019B960494DF}">
-                <a14:hiddenLine xmlns="" xmlns:a14="http://schemas.microsoft.com/office/drawing/2010/main" w="9525">
+                <a14:hiddenLine xmlns:a14="http://schemas.microsoft.com/office/drawing/2010/main" xmlns="" w="9525">
                   <a:solidFill>
                     <a:srgbClr val="000000"/>
                   </a:solidFill>
@@ -19171,7 +19171,7 @@
             </a:ln>
             <a:extLst>
               <a:ext uri="{91240B29-F687-4f45-9708-019B960494DF}">
-                <a14:hiddenLine xmlns="" xmlns:a14="http://schemas.microsoft.com/office/drawing/2010/main" w="9525">
+                <a14:hiddenLine xmlns:a14="http://schemas.microsoft.com/office/drawing/2010/main" xmlns="" w="9525">
                   <a:solidFill>
                     <a:srgbClr val="000000"/>
                   </a:solidFill>
@@ -19404,7 +19404,7 @@
             </a:ln>
             <a:extLst>
               <a:ext uri="{91240B29-F687-4f45-9708-019B960494DF}">
-                <a14:hiddenLine xmlns="" xmlns:a14="http://schemas.microsoft.com/office/drawing/2010/main" w="9525">
+                <a14:hiddenLine xmlns:a14="http://schemas.microsoft.com/office/drawing/2010/main" xmlns="" w="9525">
                   <a:solidFill>
                     <a:srgbClr val="000000"/>
                   </a:solidFill>
@@ -19657,7 +19657,7 @@
             </a:ln>
             <a:extLst>
               <a:ext uri="{91240B29-F687-4f45-9708-019B960494DF}">
-                <a14:hiddenLine xmlns="" xmlns:a14="http://schemas.microsoft.com/office/drawing/2010/main" w="9525">
+                <a14:hiddenLine xmlns:a14="http://schemas.microsoft.com/office/drawing/2010/main" xmlns="" w="9525">
                   <a:solidFill>
                     <a:srgbClr val="000000"/>
                   </a:solidFill>
@@ -19910,7 +19910,7 @@
             </a:ln>
             <a:extLst>
               <a:ext uri="{91240B29-F687-4f45-9708-019B960494DF}">
-                <a14:hiddenLine xmlns="" xmlns:a14="http://schemas.microsoft.com/office/drawing/2010/main" w="9525">
+                <a14:hiddenLine xmlns:a14="http://schemas.microsoft.com/office/drawing/2010/main" xmlns="" w="9525">
                   <a:solidFill>
                     <a:srgbClr val="000000"/>
                   </a:solidFill>
@@ -20065,7 +20065,7 @@
             </a:ln>
             <a:extLst>
               <a:ext uri="{91240B29-F687-4f45-9708-019B960494DF}">
-                <a14:hiddenLine xmlns="" xmlns:a14="http://schemas.microsoft.com/office/drawing/2010/main" w="9525">
+                <a14:hiddenLine xmlns:a14="http://schemas.microsoft.com/office/drawing/2010/main" xmlns="" w="9525">
                   <a:solidFill>
                     <a:srgbClr val="000000"/>
                   </a:solidFill>
@@ -20548,7 +20548,7 @@
           <a:graphicData uri="http://schemas.openxmlformats.org/presentationml/2006/ole">
             <mc:AlternateContent xmlns:mc="http://schemas.openxmlformats.org/markup-compatibility/2006">
               <mc:Choice xmlns:v="urn:schemas-microsoft-com:vml" Requires="v">
-                <p:oleObj spid="_x0000_s110765" name="think-cell Slide" r:id="rId4" imgW="270" imgH="270" progId="TCLayout.ActiveDocument.1">
+                <p:oleObj spid="_x0000_s110771" name="think-cell Slide" r:id="rId4" imgW="270" imgH="270" progId="TCLayout.ActiveDocument.1">
                   <p:embed/>
                 </p:oleObj>
               </mc:Choice>
@@ -20739,7 +20739,7 @@
           <a:graphicData uri="http://schemas.openxmlformats.org/presentationml/2006/ole">
             <mc:AlternateContent xmlns:mc="http://schemas.openxmlformats.org/markup-compatibility/2006">
               <mc:Choice xmlns:v="urn:schemas-microsoft-com:vml" Requires="v">
-                <p:oleObj spid="_x0000_s111768" name="think-cell Slide" r:id="rId4" imgW="270" imgH="270" progId="TCLayout.ActiveDocument.1">
+                <p:oleObj spid="_x0000_s111774" name="think-cell Slide" r:id="rId4" imgW="270" imgH="270" progId="TCLayout.ActiveDocument.1">
                   <p:embed/>
                 </p:oleObj>
               </mc:Choice>
@@ -21450,7 +21450,7 @@
           <a:graphicData uri="http://schemas.openxmlformats.org/presentationml/2006/ole">
             <mc:AlternateContent xmlns:mc="http://schemas.openxmlformats.org/markup-compatibility/2006">
               <mc:Choice xmlns:v="urn:schemas-microsoft-com:vml" Requires="v">
-                <p:oleObj spid="_x0000_s94497" name="think-cell Slide" r:id="rId4" imgW="270" imgH="270" progId="TCLayout.ActiveDocument.1">
+                <p:oleObj spid="_x0000_s94503" name="think-cell Slide" r:id="rId4" imgW="270" imgH="270" progId="TCLayout.ActiveDocument.1">
                   <p:embed/>
                 </p:oleObj>
               </mc:Choice>
@@ -22082,7 +22082,7 @@
           <a:graphicData uri="http://schemas.openxmlformats.org/presentationml/2006/ole">
             <mc:AlternateContent xmlns:mc="http://schemas.openxmlformats.org/markup-compatibility/2006">
               <mc:Choice xmlns:v="urn:schemas-microsoft-com:vml" Requires="v">
-                <p:oleObj spid="_x0000_s106687" name="think-cell Slide" r:id="rId4" imgW="270" imgH="270" progId="TCLayout.ActiveDocument.1">
+                <p:oleObj spid="_x0000_s106693" name="think-cell Slide" r:id="rId4" imgW="270" imgH="270" progId="TCLayout.ActiveDocument.1">
                   <p:embed/>
                 </p:oleObj>
               </mc:Choice>
@@ -22194,7 +22194,7 @@
           <a:graphicData uri="http://schemas.openxmlformats.org/presentationml/2006/ole">
             <mc:AlternateContent xmlns:mc="http://schemas.openxmlformats.org/markup-compatibility/2006">
               <mc:Choice xmlns:v="urn:schemas-microsoft-com:vml" Requires="v">
-                <p:oleObj spid="_x0000_s109745" name="think-cell Slide" r:id="rId4" imgW="270" imgH="270" progId="TCLayout.ActiveDocument.1">
+                <p:oleObj spid="_x0000_s109751" name="think-cell Slide" r:id="rId4" imgW="270" imgH="270" progId="TCLayout.ActiveDocument.1">
                   <p:embed/>
                 </p:oleObj>
               </mc:Choice>
@@ -22308,7 +22308,7 @@
           <a:graphicData uri="http://schemas.openxmlformats.org/presentationml/2006/ole">
             <mc:AlternateContent xmlns:mc="http://schemas.openxmlformats.org/markup-compatibility/2006">
               <mc:Choice xmlns:v="urn:schemas-microsoft-com:vml" Requires="v">
-                <p:oleObj spid="_x0000_s4627" name="think-cell Slide" r:id="rId18" imgW="270" imgH="270" progId="TCLayout.ActiveDocument.1">
+                <p:oleObj spid="_x0000_s4633" name="think-cell Slide" r:id="rId18" imgW="270" imgH="270" progId="TCLayout.ActiveDocument.1">
                   <p:embed/>
                 </p:oleObj>
               </mc:Choice>
@@ -24770,7 +24770,7 @@
           <a:graphicData uri="http://schemas.openxmlformats.org/presentationml/2006/ole">
             <mc:AlternateContent xmlns:mc="http://schemas.openxmlformats.org/markup-compatibility/2006">
               <mc:Choice xmlns:v="urn:schemas-microsoft-com:vml" Requires="v">
-                <p:oleObj spid="_x0000_s91430" name="think-cell Slide" r:id="rId6" imgW="270" imgH="270" progId="TCLayout.ActiveDocument.1">
+                <p:oleObj spid="_x0000_s91436" name="think-cell Slide" r:id="rId6" imgW="270" imgH="270" progId="TCLayout.ActiveDocument.1">
                   <p:embed/>
                 </p:oleObj>
               </mc:Choice>
@@ -25822,6 +25822,50 @@
           </a:extLst>
         </p:spPr>
       </p:pic>
+      <p:sp>
+        <p:nvSpPr>
+          <p:cNvPr id="6" name="Text Placeholder 4">
+            <a:extLst>
+              <a:ext uri="{FF2B5EF4-FFF2-40B4-BE49-F238E27FC236}">
+                <a16:creationId xmlns:a16="http://schemas.microsoft.com/office/drawing/2014/main" id="{65E75877-DDC1-4D91-91C4-79B9ECFFFC27}"/>
+              </a:ext>
+            </a:extLst>
+          </p:cNvPr>
+          <p:cNvSpPr>
+            <a:spLocks noGrp="1"/>
+          </p:cNvSpPr>
+          <p:nvPr>
+            <p:ph type="body" sz="quarter" idx="10"/>
+          </p:nvPr>
+        </p:nvSpPr>
+        <p:spPr>
+          <a:xfrm>
+            <a:off x="464839" y="2624361"/>
+            <a:ext cx="4407025" cy="1609278"/>
+          </a:xfrm>
+        </p:spPr>
+        <p:txBody>
+          <a:bodyPr>
+            <a:normAutofit/>
+          </a:bodyPr>
+          <a:lstStyle/>
+          <a:p>
+            <a:pPr marL="342900" indent="-342900">
+              <a:buFont typeface="Arial" panose="020B0604020202020204" pitchFamily="34" charset="0"/>
+              <a:buChar char="•"/>
+            </a:pPr>
+            <a:r>
+              <a:rPr lang="en-GB" sz="2400" dirty="0"/>
+              <a:t>Not by default, up to the teams to replicate </a:t>
+            </a:r>
+            <a:r>
+              <a:rPr lang="en-GB" sz="2400" dirty="0" err="1"/>
+              <a:t>ResourceGroup</a:t>
+            </a:r>
+            <a:endParaRPr lang="en-GB" sz="2400" dirty="0"/>
+          </a:p>
+        </p:txBody>
+      </p:sp>
     </p:spTree>
     <p:extLst>
       <p:ext uri="{BB962C8B-B14F-4D97-AF65-F5344CB8AC3E}">
@@ -28570,6 +28614,106 @@
           </a:p>
         </p:txBody>
       </p:sp>
+      <p:sp>
+        <p:nvSpPr>
+          <p:cNvPr id="6" name="Text Placeholder 4">
+            <a:extLst>
+              <a:ext uri="{FF2B5EF4-FFF2-40B4-BE49-F238E27FC236}">
+                <a16:creationId xmlns:a16="http://schemas.microsoft.com/office/drawing/2014/main" id="{894D2D43-6289-4248-9084-80780B2FF97D}"/>
+              </a:ext>
+            </a:extLst>
+          </p:cNvPr>
+          <p:cNvSpPr>
+            <a:spLocks noGrp="1"/>
+          </p:cNvSpPr>
+          <p:nvPr>
+            <p:ph type="body" sz="quarter" idx="10"/>
+          </p:nvPr>
+        </p:nvSpPr>
+        <p:spPr>
+          <a:xfrm>
+            <a:off x="464839" y="1819722"/>
+            <a:ext cx="5631161" cy="3218555"/>
+          </a:xfrm>
+        </p:spPr>
+        <p:txBody>
+          <a:bodyPr>
+            <a:normAutofit/>
+          </a:bodyPr>
+          <a:lstStyle/>
+          <a:p>
+            <a:pPr marL="342900" indent="-342900">
+              <a:buFont typeface="Arial" panose="020B0604020202020204" pitchFamily="34" charset="0"/>
+              <a:buChar char="•"/>
+            </a:pPr>
+            <a:endParaRPr lang="en-GB" dirty="0"/>
+          </a:p>
+          <a:p>
+            <a:pPr marL="342900" indent="-342900">
+              <a:buFont typeface="Arial" panose="020B0604020202020204" pitchFamily="34" charset="0"/>
+              <a:buChar char="•"/>
+            </a:pPr>
+            <a:r>
+              <a:rPr lang="en-GB" dirty="0">
+                <a:sym typeface="Wingdings" panose="05000000000000000000" pitchFamily="2" charset="2"/>
+              </a:rPr>
+              <a:t>Access with AAD</a:t>
+            </a:r>
+          </a:p>
+          <a:p>
+            <a:pPr marL="342900" indent="-342900">
+              <a:buFont typeface="Arial" panose="020B0604020202020204" pitchFamily="34" charset="0"/>
+              <a:buChar char="•"/>
+            </a:pPr>
+            <a:endParaRPr lang="en-GB" dirty="0"/>
+          </a:p>
+          <a:p>
+            <a:pPr marL="342900" indent="-342900">
+              <a:buFont typeface="Arial" panose="020B0604020202020204" pitchFamily="34" charset="0"/>
+              <a:buChar char="•"/>
+            </a:pPr>
+            <a:r>
+              <a:rPr lang="en-GB" dirty="0"/>
+              <a:t>Backend storage account – </a:t>
+            </a:r>
+            <a:r>
+              <a:rPr lang="en-GB" dirty="0" err="1"/>
+              <a:t>azurewebjobhosts</a:t>
+            </a:r>
+            <a:r>
+              <a:rPr lang="en-GB" dirty="0"/>
+              <a:t> and </a:t>
+            </a:r>
+            <a:r>
+              <a:rPr lang="en-GB" dirty="0" err="1"/>
+              <a:t>azurewebjobsecrets</a:t>
+            </a:r>
+            <a:endParaRPr lang="en-GB" dirty="0"/>
+          </a:p>
+          <a:p>
+            <a:pPr marL="342900" indent="-342900">
+              <a:buFont typeface="Arial" panose="020B0604020202020204" pitchFamily="34" charset="0"/>
+              <a:buChar char="•"/>
+            </a:pPr>
+            <a:endParaRPr lang="en-GB" dirty="0"/>
+          </a:p>
+          <a:p>
+            <a:pPr marL="342900" indent="-342900">
+              <a:buFont typeface="Arial" panose="020B0604020202020204" pitchFamily="34" charset="0"/>
+              <a:buChar char="•"/>
+            </a:pPr>
+            <a:r>
+              <a:rPr lang="en-GB" dirty="0"/>
+              <a:t>KUDU/</a:t>
+            </a:r>
+            <a:r>
+              <a:rPr lang="en-GB" dirty="0" err="1"/>
+              <a:t>AppServiceEditor</a:t>
+            </a:r>
+            <a:endParaRPr lang="en-GB" dirty="0"/>
+          </a:p>
+        </p:txBody>
+      </p:sp>
     </p:spTree>
     <p:extLst>
       <p:ext uri="{BB962C8B-B14F-4D97-AF65-F5344CB8AC3E}">
@@ -28886,6 +29030,93 @@
           </a:extLst>
         </p:spPr>
       </p:pic>
+      <p:sp>
+        <p:nvSpPr>
+          <p:cNvPr id="6" name="Text Placeholder 4">
+            <a:extLst>
+              <a:ext uri="{FF2B5EF4-FFF2-40B4-BE49-F238E27FC236}">
+                <a16:creationId xmlns:a16="http://schemas.microsoft.com/office/drawing/2014/main" id="{3EC4528C-6124-4870-A510-35318F08226E}"/>
+              </a:ext>
+            </a:extLst>
+          </p:cNvPr>
+          <p:cNvSpPr>
+            <a:spLocks noGrp="1"/>
+          </p:cNvSpPr>
+          <p:nvPr>
+            <p:ph type="body" sz="quarter" idx="10"/>
+          </p:nvPr>
+        </p:nvSpPr>
+        <p:spPr>
+          <a:xfrm>
+            <a:off x="464839" y="1819722"/>
+            <a:ext cx="4911081" cy="3218555"/>
+          </a:xfrm>
+        </p:spPr>
+        <p:txBody>
+          <a:bodyPr>
+            <a:normAutofit/>
+          </a:bodyPr>
+          <a:lstStyle/>
+          <a:p>
+            <a:pPr marL="342900" indent="-342900">
+              <a:buFont typeface="Arial" panose="020B0604020202020204" pitchFamily="34" charset="0"/>
+              <a:buChar char="•"/>
+            </a:pPr>
+            <a:r>
+              <a:rPr lang="en-GB" dirty="0"/>
+              <a:t>Consumption: Pay-as-you-go</a:t>
+            </a:r>
+          </a:p>
+          <a:p>
+            <a:pPr marL="342900" indent="-342900">
+              <a:buFont typeface="Arial" panose="020B0604020202020204" pitchFamily="34" charset="0"/>
+              <a:buChar char="•"/>
+            </a:pPr>
+            <a:endParaRPr lang="en-GB" dirty="0"/>
+          </a:p>
+          <a:p>
+            <a:pPr marL="342900" indent="-342900">
+              <a:buFont typeface="Arial" panose="020B0604020202020204" pitchFamily="34" charset="0"/>
+              <a:buChar char="•"/>
+            </a:pPr>
+            <a:r>
+              <a:rPr lang="en-GB" dirty="0"/>
+              <a:t>Premium Plan</a:t>
+            </a:r>
+          </a:p>
+          <a:p>
+            <a:pPr marL="342900" indent="-342900">
+              <a:buFont typeface="Arial" panose="020B0604020202020204" pitchFamily="34" charset="0"/>
+              <a:buChar char="•"/>
+            </a:pPr>
+            <a:endParaRPr lang="en-GB" dirty="0"/>
+          </a:p>
+          <a:p>
+            <a:pPr marL="342900" indent="-342900">
+              <a:buFont typeface="Arial" panose="020B0604020202020204" pitchFamily="34" charset="0"/>
+              <a:buChar char="•"/>
+            </a:pPr>
+            <a:r>
+              <a:rPr lang="en-GB" dirty="0"/>
+              <a:t>AppService Plans</a:t>
+            </a:r>
+          </a:p>
+          <a:p>
+            <a:pPr marL="342900" indent="-342900">
+              <a:buFont typeface="Arial" panose="020B0604020202020204" pitchFamily="34" charset="0"/>
+              <a:buChar char="•"/>
+            </a:pPr>
+            <a:endParaRPr lang="en-GB" dirty="0"/>
+          </a:p>
+          <a:p>
+            <a:pPr marL="342900" indent="-342900">
+              <a:buFont typeface="Arial" panose="020B0604020202020204" pitchFamily="34" charset="0"/>
+              <a:buChar char="•"/>
+            </a:pPr>
+            <a:endParaRPr lang="en-GB" dirty="0"/>
+          </a:p>
+        </p:txBody>
+      </p:sp>
     </p:spTree>
     <p:extLst>
       <p:ext uri="{BB962C8B-B14F-4D97-AF65-F5344CB8AC3E}">

</xml_diff>